<commit_message>
Included Java Lab Programs
</commit_message>
<xml_diff>
--- a/Java MCA-2.pptx
+++ b/Java MCA-2.pptx
@@ -13,11 +13,11 @@
     <p:sldId id="278" r:id="rId7"/>
     <p:sldId id="265" r:id="rId8"/>
     <p:sldId id="266" r:id="rId9"/>
-    <p:sldId id="267" r:id="rId10"/>
-    <p:sldId id="268" r:id="rId11"/>
-    <p:sldId id="269" r:id="rId12"/>
-    <p:sldId id="270" r:id="rId13"/>
-    <p:sldId id="271" r:id="rId14"/>
+    <p:sldId id="268" r:id="rId10"/>
+    <p:sldId id="267" r:id="rId11"/>
+    <p:sldId id="270" r:id="rId12"/>
+    <p:sldId id="271" r:id="rId13"/>
+    <p:sldId id="269" r:id="rId14"/>
     <p:sldId id="272" r:id="rId15"/>
     <p:sldId id="273" r:id="rId16"/>
     <p:sldId id="274" r:id="rId17"/>
@@ -122,6 +122,11 @@
       </a:defRPr>
     </a:lvl9pPr>
   </p:defaultTextStyle>
+  <p:extLst>
+    <p:ext uri="{EFAFB233-063F-42B5-8137-9DF3F51BA10A}">
+      <p15:sldGuideLst xmlns:p15="http://schemas.microsoft.com/office/powerpoint/2012/main"/>
+    </p:ext>
+  </p:extLst>
 </p:presentation>
 </file>
 
@@ -274,7 +279,7 @@
           <a:p>
             <a:fld id="{A96D8E49-6906-44F2-ABD2-E9501E5C67F3}" type="datetimeFigureOut">
               <a:rPr lang="en-IN" smtClean="0"/>
-              <a:t>14-07-2024</a:t>
+              <a:t>18-07-2024</a:t>
             </a:fld>
             <a:endParaRPr lang="en-IN"/>
           </a:p>
@@ -474,7 +479,7 @@
           <a:p>
             <a:fld id="{A96D8E49-6906-44F2-ABD2-E9501E5C67F3}" type="datetimeFigureOut">
               <a:rPr lang="en-IN" smtClean="0"/>
-              <a:t>14-07-2024</a:t>
+              <a:t>18-07-2024</a:t>
             </a:fld>
             <a:endParaRPr lang="en-IN"/>
           </a:p>
@@ -684,7 +689,7 @@
           <a:p>
             <a:fld id="{A96D8E49-6906-44F2-ABD2-E9501E5C67F3}" type="datetimeFigureOut">
               <a:rPr lang="en-IN" smtClean="0"/>
-              <a:t>14-07-2024</a:t>
+              <a:t>18-07-2024</a:t>
             </a:fld>
             <a:endParaRPr lang="en-IN"/>
           </a:p>
@@ -884,7 +889,7 @@
           <a:p>
             <a:fld id="{A96D8E49-6906-44F2-ABD2-E9501E5C67F3}" type="datetimeFigureOut">
               <a:rPr lang="en-IN" smtClean="0"/>
-              <a:t>14-07-2024</a:t>
+              <a:t>18-07-2024</a:t>
             </a:fld>
             <a:endParaRPr lang="en-IN"/>
           </a:p>
@@ -1160,7 +1165,7 @@
           <a:p>
             <a:fld id="{A96D8E49-6906-44F2-ABD2-E9501E5C67F3}" type="datetimeFigureOut">
               <a:rPr lang="en-IN" smtClean="0"/>
-              <a:t>14-07-2024</a:t>
+              <a:t>18-07-2024</a:t>
             </a:fld>
             <a:endParaRPr lang="en-IN"/>
           </a:p>
@@ -1428,7 +1433,7 @@
           <a:p>
             <a:fld id="{A96D8E49-6906-44F2-ABD2-E9501E5C67F3}" type="datetimeFigureOut">
               <a:rPr lang="en-IN" smtClean="0"/>
-              <a:t>14-07-2024</a:t>
+              <a:t>18-07-2024</a:t>
             </a:fld>
             <a:endParaRPr lang="en-IN"/>
           </a:p>
@@ -1843,7 +1848,7 @@
           <a:p>
             <a:fld id="{A96D8E49-6906-44F2-ABD2-E9501E5C67F3}" type="datetimeFigureOut">
               <a:rPr lang="en-IN" smtClean="0"/>
-              <a:t>14-07-2024</a:t>
+              <a:t>18-07-2024</a:t>
             </a:fld>
             <a:endParaRPr lang="en-IN"/>
           </a:p>
@@ -1985,7 +1990,7 @@
           <a:p>
             <a:fld id="{A96D8E49-6906-44F2-ABD2-E9501E5C67F3}" type="datetimeFigureOut">
               <a:rPr lang="en-IN" smtClean="0"/>
-              <a:t>14-07-2024</a:t>
+              <a:t>18-07-2024</a:t>
             </a:fld>
             <a:endParaRPr lang="en-IN"/>
           </a:p>
@@ -2098,7 +2103,7 @@
           <a:p>
             <a:fld id="{A96D8E49-6906-44F2-ABD2-E9501E5C67F3}" type="datetimeFigureOut">
               <a:rPr lang="en-IN" smtClean="0"/>
-              <a:t>14-07-2024</a:t>
+              <a:t>18-07-2024</a:t>
             </a:fld>
             <a:endParaRPr lang="en-IN"/>
           </a:p>
@@ -2411,7 +2416,7 @@
           <a:p>
             <a:fld id="{A96D8E49-6906-44F2-ABD2-E9501E5C67F3}" type="datetimeFigureOut">
               <a:rPr lang="en-IN" smtClean="0"/>
-              <a:t>14-07-2024</a:t>
+              <a:t>18-07-2024</a:t>
             </a:fld>
             <a:endParaRPr lang="en-IN"/>
           </a:p>
@@ -2700,7 +2705,7 @@
           <a:p>
             <a:fld id="{A96D8E49-6906-44F2-ABD2-E9501E5C67F3}" type="datetimeFigureOut">
               <a:rPr lang="en-IN" smtClean="0"/>
-              <a:t>14-07-2024</a:t>
+              <a:t>18-07-2024</a:t>
             </a:fld>
             <a:endParaRPr lang="en-IN"/>
           </a:p>
@@ -2943,7 +2948,7 @@
           <a:p>
             <a:fld id="{A96D8E49-6906-44F2-ABD2-E9501E5C67F3}" type="datetimeFigureOut">
               <a:rPr lang="en-IN" smtClean="0"/>
-              <a:t>14-07-2024</a:t>
+              <a:t>18-07-2024</a:t>
             </a:fld>
             <a:endParaRPr lang="en-IN"/>
           </a:p>
@@ -3735,25 +3740,228 @@
         </p:nvSpPr>
         <p:spPr>
           <a:xfrm>
-            <a:off x="786581" y="609600"/>
-            <a:ext cx="10567219" cy="5567363"/>
+            <a:off x="538931" y="428625"/>
+            <a:ext cx="11272069" cy="5991225"/>
           </a:xfrm>
         </p:spPr>
         <p:txBody>
-          <a:bodyPr/>
-          <a:lstStyle/>
-          <a:p>
-            <a:pPr marL="0" indent="0">
-              <a:buNone/>
-            </a:pPr>
-            <a:endParaRPr lang="en-IN" dirty="0"/>
+          <a:bodyPr>
+            <a:normAutofit/>
+          </a:bodyPr>
+          <a:lstStyle/>
+          <a:p>
+            <a:pPr marL="0" indent="0">
+              <a:buNone/>
+            </a:pPr>
+            <a:r>
+              <a:rPr lang="en-IN" sz="2400" b="1" dirty="0">
+                <a:solidFill>
+                  <a:srgbClr val="C00000"/>
+                </a:solidFill>
+              </a:rPr>
+              <a:t>History of Java:</a:t>
+            </a:r>
+          </a:p>
+          <a:p>
+            <a:pPr marL="0" indent="0">
+              <a:buNone/>
+            </a:pPr>
+            <a:r>
+              <a:rPr lang="en-US" sz="2000" b="1" dirty="0"/>
+              <a:t>Early Beginnings</a:t>
+            </a:r>
+          </a:p>
+          <a:p>
+            <a:pPr marL="0" indent="0">
+              <a:buNone/>
+            </a:pPr>
+            <a:r>
+              <a:rPr lang="en-US" sz="2000" b="1" dirty="0"/>
+              <a:t>1991: Project Initiation</a:t>
+            </a:r>
+            <a:endParaRPr lang="en-US" sz="2000" dirty="0"/>
+          </a:p>
+          <a:p>
+            <a:pPr marL="457200" lvl="1" indent="0">
+              <a:buNone/>
+            </a:pPr>
+            <a:r>
+              <a:rPr lang="en-US" sz="2000" dirty="0"/>
+              <a:t>Java began as a project called "</a:t>
+            </a:r>
+            <a:r>
+              <a:rPr lang="en-US" sz="2000" b="1" dirty="0">
+                <a:solidFill>
+                  <a:srgbClr val="C00000"/>
+                </a:solidFill>
+              </a:rPr>
+              <a:t>Oak</a:t>
+            </a:r>
+            <a:r>
+              <a:rPr lang="en-US" sz="2000" dirty="0"/>
+              <a:t>" by Sun Microsystems, led by James Gosling, Mike Sheridan, and Patrick Naughton. They were part of a team at </a:t>
+            </a:r>
+            <a:r>
+              <a:rPr lang="en-US" sz="2000" b="1" dirty="0"/>
+              <a:t>Sun Microsystems </a:t>
+            </a:r>
+            <a:r>
+              <a:rPr lang="en-US" sz="2000" dirty="0"/>
+              <a:t>that initiated the project in the early 1990s. The goal was to develop a language for </a:t>
+            </a:r>
+            <a:r>
+              <a:rPr lang="en-US" sz="2000" b="1" dirty="0">
+                <a:solidFill>
+                  <a:srgbClr val="C00000"/>
+                </a:solidFill>
+              </a:rPr>
+              <a:t>embedded systems in consumer electronics, </a:t>
+            </a:r>
+            <a:r>
+              <a:rPr lang="en-US" sz="2000" dirty="0"/>
+              <a:t>, and it eventually evolved into the Java programming language we know today.</a:t>
+            </a:r>
+          </a:p>
+          <a:p>
+            <a:pPr marL="457200" lvl="1" indent="0">
+              <a:buNone/>
+            </a:pPr>
+            <a:endParaRPr lang="en-US" sz="2000" dirty="0"/>
+          </a:p>
+          <a:p>
+            <a:pPr marL="0" indent="0">
+              <a:buNone/>
+            </a:pPr>
+            <a:r>
+              <a:rPr lang="en-US" sz="2000" b="1" dirty="0"/>
+              <a:t>1992: Green Project</a:t>
+            </a:r>
+            <a:endParaRPr lang="en-US" sz="2000" dirty="0"/>
+          </a:p>
+          <a:p>
+            <a:pPr marL="457200" lvl="1" indent="0">
+              <a:buNone/>
+            </a:pPr>
+            <a:r>
+              <a:rPr lang="en-US" sz="2000" dirty="0"/>
+              <a:t>The team, known as the Green Team, worked on creating a platform-independent language. They aimed to create a language that could run on various devices, including </a:t>
+            </a:r>
+            <a:r>
+              <a:rPr lang="en-US" sz="2000" b="1" dirty="0"/>
+              <a:t>televisions</a:t>
+            </a:r>
+            <a:r>
+              <a:rPr lang="en-US" sz="2000" dirty="0"/>
+              <a:t>, </a:t>
+            </a:r>
+            <a:r>
+              <a:rPr lang="en-US" sz="2000" b="1" dirty="0"/>
+              <a:t>toasters</a:t>
+            </a:r>
+            <a:r>
+              <a:rPr lang="en-US" sz="2000" dirty="0"/>
+              <a:t>, and other consumer electronics.</a:t>
+            </a:r>
+          </a:p>
+          <a:p>
+            <a:pPr marL="0" indent="0">
+              <a:buNone/>
+            </a:pPr>
+            <a:endParaRPr lang="en-US" sz="2000" dirty="0"/>
+          </a:p>
+          <a:p>
+            <a:pPr marL="0" indent="0">
+              <a:buNone/>
+            </a:pPr>
+            <a:r>
+              <a:rPr lang="en-US" sz="2000" b="1" dirty="0"/>
+              <a:t>1994: Transition to the Web</a:t>
+            </a:r>
+            <a:endParaRPr lang="en-US" sz="2000" dirty="0"/>
+          </a:p>
+          <a:p>
+            <a:pPr marL="457200" lvl="1" indent="0">
+              <a:buNone/>
+            </a:pPr>
+            <a:r>
+              <a:rPr lang="en-US" sz="2000" dirty="0"/>
+              <a:t>The team realized the potential of their new language for the burgeoning </a:t>
+            </a:r>
+            <a:r>
+              <a:rPr lang="en-US" sz="2000" b="1" dirty="0">
+                <a:solidFill>
+                  <a:srgbClr val="C00000"/>
+                </a:solidFill>
+              </a:rPr>
+              <a:t>World Wide Web</a:t>
+            </a:r>
+            <a:r>
+              <a:rPr lang="en-US" sz="2000" dirty="0"/>
+              <a:t>, where the ability to run the same program on different platforms was highly desirable. They renamed </a:t>
+            </a:r>
+            <a:r>
+              <a:rPr lang="en-US" sz="2000" b="1" dirty="0"/>
+              <a:t>Oak</a:t>
+            </a:r>
+            <a:r>
+              <a:rPr lang="en-US" sz="2000" dirty="0"/>
+              <a:t> to </a:t>
+            </a:r>
+            <a:r>
+              <a:rPr lang="en-US" sz="2000" b="1" dirty="0"/>
+              <a:t>Java</a:t>
+            </a:r>
+            <a:r>
+              <a:rPr lang="en-US" sz="2000" dirty="0"/>
+              <a:t>, inspired by </a:t>
+            </a:r>
+            <a:r>
+              <a:rPr lang="en-US" sz="2000" b="1" dirty="0">
+                <a:solidFill>
+                  <a:srgbClr val="C00000"/>
+                </a:solidFill>
+              </a:rPr>
+              <a:t>Java coffee</a:t>
+            </a:r>
+            <a:r>
+              <a:rPr lang="en-US" sz="2000" dirty="0"/>
+              <a:t>, which was consumed in large quantities by the developers.</a:t>
+            </a:r>
+          </a:p>
+          <a:p>
+            <a:pPr marL="0" indent="0">
+              <a:buNone/>
+            </a:pPr>
+            <a:endParaRPr lang="en-US" sz="2000" dirty="0"/>
+          </a:p>
+          <a:p>
+            <a:pPr marL="457200" lvl="1" indent="0">
+              <a:buNone/>
+            </a:pPr>
+            <a:endParaRPr lang="en-US" sz="2000" b="1" dirty="0">
+              <a:solidFill>
+                <a:srgbClr val="C00000"/>
+              </a:solidFill>
+            </a:endParaRPr>
+          </a:p>
+          <a:p>
+            <a:pPr marL="0" indent="0">
+              <a:buNone/>
+            </a:pPr>
+            <a:endParaRPr lang="en-US" sz="2400" dirty="0"/>
+          </a:p>
+          <a:p>
+            <a:pPr marL="0" indent="0">
+              <a:buNone/>
+            </a:pPr>
+            <a:endParaRPr lang="en-IN" sz="2400" dirty="0"/>
           </a:p>
         </p:txBody>
       </p:sp>
     </p:spTree>
     <p:extLst>
       <p:ext uri="{BB962C8B-B14F-4D97-AF65-F5344CB8AC3E}">
-        <p14:creationId xmlns:p14="http://schemas.microsoft.com/office/powerpoint/2010/main" val="3779466235"/>
+        <p14:creationId xmlns:p14="http://schemas.microsoft.com/office/powerpoint/2010/main" val="730276957"/>
       </p:ext>
     </p:extLst>
   </p:cSld>
@@ -3798,25 +4006,249 @@
         </p:nvSpPr>
         <p:spPr>
           <a:xfrm>
-            <a:off x="786581" y="609600"/>
-            <a:ext cx="10567219" cy="5567363"/>
+            <a:off x="624656" y="352425"/>
+            <a:ext cx="11014894" cy="6096000"/>
           </a:xfrm>
         </p:spPr>
         <p:txBody>
-          <a:bodyPr/>
-          <a:lstStyle/>
-          <a:p>
-            <a:pPr marL="0" indent="0">
-              <a:buNone/>
-            </a:pPr>
-            <a:endParaRPr lang="en-IN" dirty="0"/>
+          <a:bodyPr>
+            <a:normAutofit/>
+          </a:bodyPr>
+          <a:lstStyle/>
+          <a:p>
+            <a:pPr marL="0" indent="0">
+              <a:buNone/>
+            </a:pPr>
+            <a:r>
+              <a:rPr lang="en-US" sz="1800" b="1" dirty="0">
+                <a:solidFill>
+                  <a:srgbClr val="C00000"/>
+                </a:solidFill>
+              </a:rPr>
+              <a:t>Official Launch</a:t>
+            </a:r>
+          </a:p>
+          <a:p>
+            <a:pPr marL="0" indent="0">
+              <a:buNone/>
+            </a:pPr>
+            <a:r>
+              <a:rPr lang="en-US" sz="1800" b="1" dirty="0"/>
+              <a:t>1995: Public Introduction</a:t>
+            </a:r>
+            <a:endParaRPr lang="en-US" sz="1800" dirty="0"/>
+          </a:p>
+          <a:p>
+            <a:pPr marL="457200" lvl="1" indent="0">
+              <a:buNone/>
+            </a:pPr>
+            <a:r>
+              <a:rPr lang="en-US" sz="1800" dirty="0"/>
+              <a:t>Java 1.0 was officially released by </a:t>
+            </a:r>
+            <a:r>
+              <a:rPr lang="en-US" sz="1800" b="1" dirty="0">
+                <a:solidFill>
+                  <a:srgbClr val="C00000"/>
+                </a:solidFill>
+              </a:rPr>
+              <a:t>Sun Microsystems</a:t>
+            </a:r>
+            <a:r>
+              <a:rPr lang="en-US" sz="1800" dirty="0"/>
+              <a:t>. The "Write Once, Run Anywhere" (</a:t>
+            </a:r>
+            <a:r>
+              <a:rPr lang="en-US" sz="1800" b="1" dirty="0">
+                <a:solidFill>
+                  <a:srgbClr val="C00000"/>
+                </a:solidFill>
+              </a:rPr>
+              <a:t>WORA</a:t>
+            </a:r>
+            <a:r>
+              <a:rPr lang="en-US" sz="1800" dirty="0"/>
+              <a:t>) capability became a significant selling point, allowing Java programs to run on any device with a Java Virtual Machine (</a:t>
+            </a:r>
+            <a:r>
+              <a:rPr lang="en-US" sz="1800" b="1" dirty="0">
+                <a:solidFill>
+                  <a:srgbClr val="C00000"/>
+                </a:solidFill>
+              </a:rPr>
+              <a:t>JVM</a:t>
+            </a:r>
+            <a:r>
+              <a:rPr lang="en-US" sz="1800" dirty="0"/>
+              <a:t>).</a:t>
+            </a:r>
+          </a:p>
+          <a:p>
+            <a:pPr marL="0" indent="0">
+              <a:buNone/>
+            </a:pPr>
+            <a:endParaRPr lang="en-US" sz="1800" b="1" dirty="0"/>
+          </a:p>
+          <a:p>
+            <a:pPr marL="0" indent="0">
+              <a:buNone/>
+            </a:pPr>
+            <a:r>
+              <a:rPr lang="en-US" sz="1800" b="1" dirty="0">
+                <a:solidFill>
+                  <a:srgbClr val="C00000"/>
+                </a:solidFill>
+              </a:rPr>
+              <a:t>Evolution and Growth</a:t>
+            </a:r>
+          </a:p>
+          <a:p>
+            <a:pPr marL="0" indent="0">
+              <a:buNone/>
+            </a:pPr>
+            <a:r>
+              <a:rPr lang="en-US" sz="1800" b="1" dirty="0"/>
+              <a:t>1996: Java Development Kit (JDK) 1.0</a:t>
+            </a:r>
+            <a:endParaRPr lang="en-US" sz="1800" dirty="0"/>
+          </a:p>
+          <a:p>
+            <a:pPr marL="457200" lvl="1" indent="0">
+              <a:buNone/>
+            </a:pPr>
+            <a:r>
+              <a:rPr lang="en-US" sz="1800" dirty="0"/>
+              <a:t>Sun Microsystems released JDK 1.0, providing developers with the </a:t>
+            </a:r>
+            <a:r>
+              <a:rPr lang="en-US" sz="1800" b="1" dirty="0">
+                <a:solidFill>
+                  <a:srgbClr val="C00000"/>
+                </a:solidFill>
+              </a:rPr>
+              <a:t>tools</a:t>
+            </a:r>
+            <a:r>
+              <a:rPr lang="en-US" sz="1800" b="1" dirty="0"/>
+              <a:t> needed to develop Java applications</a:t>
+            </a:r>
+            <a:r>
+              <a:rPr lang="en-US" sz="1800" dirty="0"/>
+              <a:t>.</a:t>
+            </a:r>
+          </a:p>
+          <a:p>
+            <a:pPr marL="0" indent="0">
+              <a:buNone/>
+            </a:pPr>
+            <a:r>
+              <a:rPr lang="en-US" sz="1800" b="1" dirty="0"/>
+              <a:t>1997-1999: Rapid Evolution</a:t>
+            </a:r>
+            <a:endParaRPr lang="en-US" sz="1800" dirty="0"/>
+          </a:p>
+          <a:p>
+            <a:pPr marL="457200" lvl="1" indent="0">
+              <a:buNone/>
+            </a:pPr>
+            <a:r>
+              <a:rPr lang="en-US" sz="1800" dirty="0"/>
+              <a:t>Java 1.1 was released in 1997, introducing new features like inner classes and JavaBeans.</a:t>
+            </a:r>
+          </a:p>
+          <a:p>
+            <a:pPr marL="457200" lvl="1" indent="0">
+              <a:buNone/>
+            </a:pPr>
+            <a:r>
+              <a:rPr lang="en-US" sz="1800" dirty="0"/>
+              <a:t>In 1998, Java 2 (formerly known as JDK 1.2) introduced major enhancements to the platform, including the Swing </a:t>
+            </a:r>
+            <a:r>
+              <a:rPr lang="en-US" sz="1800" b="1" dirty="0"/>
+              <a:t>graphical API </a:t>
+            </a:r>
+            <a:r>
+              <a:rPr lang="en-US" sz="1800" dirty="0"/>
+              <a:t>and </a:t>
+            </a:r>
+            <a:r>
+              <a:rPr lang="en-US" sz="1800" b="1" dirty="0">
+                <a:solidFill>
+                  <a:srgbClr val="C00000"/>
+                </a:solidFill>
+              </a:rPr>
+              <a:t>the Collections framework.</a:t>
+            </a:r>
+          </a:p>
+          <a:p>
+            <a:pPr marL="0" indent="0">
+              <a:buNone/>
+            </a:pPr>
+            <a:endParaRPr lang="en-US" sz="1800" b="1" dirty="0"/>
+          </a:p>
+          <a:p>
+            <a:pPr marL="0" indent="0">
+              <a:buNone/>
+            </a:pPr>
+            <a:r>
+              <a:rPr lang="en-US" sz="1800" b="1" dirty="0">
+                <a:solidFill>
+                  <a:srgbClr val="C00000"/>
+                </a:solidFill>
+              </a:rPr>
+              <a:t>Java Community Process</a:t>
+            </a:r>
+          </a:p>
+          <a:p>
+            <a:pPr marL="0" indent="0">
+              <a:buNone/>
+            </a:pPr>
+            <a:r>
+              <a:rPr lang="en-US" sz="1800" b="1" dirty="0"/>
+              <a:t>1999: Establishment of the Java Community Process (JCP)</a:t>
+            </a:r>
+            <a:endParaRPr lang="en-US" sz="1800" dirty="0"/>
+          </a:p>
+          <a:p>
+            <a:pPr marL="457200" lvl="1" indent="0">
+              <a:buNone/>
+            </a:pPr>
+            <a:r>
+              <a:rPr lang="en-US" sz="1800" dirty="0"/>
+              <a:t>The JCP was established to allow for the participation of the </a:t>
+            </a:r>
+            <a:r>
+              <a:rPr lang="en-US" sz="1800" b="1" dirty="0">
+                <a:solidFill>
+                  <a:srgbClr val="C00000"/>
+                </a:solidFill>
+              </a:rPr>
+              <a:t>broader Java community </a:t>
+            </a:r>
+            <a:r>
+              <a:rPr lang="en-US" sz="1800" dirty="0"/>
+              <a:t>in the development and evolution of Java standards and specifications.</a:t>
+            </a:r>
+          </a:p>
+          <a:p>
+            <a:pPr marL="0" indent="0">
+              <a:buNone/>
+            </a:pPr>
+            <a:endParaRPr lang="en-US" sz="1800" b="1" dirty="0"/>
+          </a:p>
+          <a:p>
+            <a:pPr marL="0" indent="0">
+              <a:buNone/>
+            </a:pPr>
+            <a:endParaRPr lang="en-IN" sz="1800" dirty="0"/>
           </a:p>
         </p:txBody>
       </p:sp>
     </p:spTree>
     <p:extLst>
       <p:ext uri="{BB962C8B-B14F-4D97-AF65-F5344CB8AC3E}">
-        <p14:creationId xmlns:p14="http://schemas.microsoft.com/office/powerpoint/2010/main" val="2459504580"/>
+        <p14:creationId xmlns:p14="http://schemas.microsoft.com/office/powerpoint/2010/main" val="2310642585"/>
       </p:ext>
     </p:extLst>
   </p:cSld>
@@ -3866,20 +4298,177 @@
           </a:xfrm>
         </p:spPr>
         <p:txBody>
-          <a:bodyPr/>
-          <a:lstStyle/>
-          <a:p>
-            <a:pPr marL="0" indent="0">
-              <a:buNone/>
-            </a:pPr>
-            <a:endParaRPr lang="en-IN" dirty="0"/>
+          <a:bodyPr>
+            <a:normAutofit/>
+          </a:bodyPr>
+          <a:lstStyle/>
+          <a:p>
+            <a:pPr marL="0" indent="0">
+              <a:buNone/>
+            </a:pPr>
+            <a:r>
+              <a:rPr lang="en-US" sz="2000" b="1" dirty="0">
+                <a:solidFill>
+                  <a:srgbClr val="C00000"/>
+                </a:solidFill>
+              </a:rPr>
+              <a:t>Open Source and Later Versions</a:t>
+            </a:r>
+          </a:p>
+          <a:p>
+            <a:pPr marL="0" indent="0">
+              <a:buNone/>
+            </a:pPr>
+            <a:r>
+              <a:rPr lang="en-US" sz="1800" b="1" dirty="0"/>
+              <a:t>2006: Open Sourcing of Java</a:t>
+            </a:r>
+            <a:endParaRPr lang="en-US" sz="1800" dirty="0"/>
+          </a:p>
+          <a:p>
+            <a:pPr marL="457200" lvl="1" indent="0">
+              <a:buNone/>
+            </a:pPr>
+            <a:r>
+              <a:rPr lang="en-US" sz="1800" dirty="0"/>
+              <a:t>Sun Microsystems announced that Java would be released under the GNU General Public License (GPL), making it open-source and allowing the community to </a:t>
+            </a:r>
+            <a:r>
+              <a:rPr lang="en-US" sz="1800" b="1" dirty="0"/>
+              <a:t>contribute</a:t>
+            </a:r>
+            <a:r>
+              <a:rPr lang="en-US" sz="1800" dirty="0"/>
+              <a:t> to its development.</a:t>
+            </a:r>
+          </a:p>
+          <a:p>
+            <a:pPr marL="0" indent="0">
+              <a:buNone/>
+            </a:pPr>
+            <a:r>
+              <a:rPr lang="en-US" sz="1800" b="1" dirty="0"/>
+              <a:t>2009: </a:t>
+            </a:r>
+            <a:r>
+              <a:rPr lang="en-US" sz="1800" b="1" dirty="0">
+                <a:solidFill>
+                  <a:srgbClr val="C00000"/>
+                </a:solidFill>
+              </a:rPr>
+              <a:t>Acquisition by Oracle</a:t>
+            </a:r>
+            <a:endParaRPr lang="en-US" sz="1800" dirty="0">
+              <a:solidFill>
+                <a:srgbClr val="C00000"/>
+              </a:solidFill>
+            </a:endParaRPr>
+          </a:p>
+          <a:p>
+            <a:pPr marL="457200" lvl="1" indent="0">
+              <a:buNone/>
+            </a:pPr>
+            <a:r>
+              <a:rPr lang="en-US" sz="1800" b="1" dirty="0">
+                <a:solidFill>
+                  <a:srgbClr val="C00000"/>
+                </a:solidFill>
+              </a:rPr>
+              <a:t>Oracle Corporation </a:t>
+            </a:r>
+            <a:r>
+              <a:rPr lang="en-US" sz="1800" b="1" dirty="0"/>
+              <a:t>acquired Sun Microsystems</a:t>
+            </a:r>
+            <a:r>
+              <a:rPr lang="en-US" sz="1800" dirty="0"/>
+              <a:t>, becoming the steward of Java. This led to concerns about the future direction of Java, but Oracle continued to develop and support the language.</a:t>
+            </a:r>
+          </a:p>
+          <a:p>
+            <a:pPr marL="0" indent="0">
+              <a:buNone/>
+            </a:pPr>
+            <a:r>
+              <a:rPr lang="en-US" sz="1800" b="1" dirty="0"/>
+              <a:t>2011-Present: Ongoing Evolution</a:t>
+            </a:r>
+            <a:endParaRPr lang="en-US" sz="1800" dirty="0"/>
+          </a:p>
+          <a:p>
+            <a:pPr marL="457200" lvl="1" indent="0">
+              <a:buNone/>
+            </a:pPr>
+            <a:r>
+              <a:rPr lang="en-US" sz="1800" dirty="0"/>
+              <a:t>Java 7 was released in 2011, introducing new language features and performance improvements.</a:t>
+            </a:r>
+          </a:p>
+          <a:p>
+            <a:pPr marL="457200" lvl="1" indent="0">
+              <a:buNone/>
+            </a:pPr>
+            <a:r>
+              <a:rPr lang="en-US" sz="1800" dirty="0"/>
+              <a:t>Java 8, released in 2014, brought significant changes, including the introduction of </a:t>
+            </a:r>
+            <a:r>
+              <a:rPr lang="en-US" sz="1800" b="1" dirty="0"/>
+              <a:t>lambda expressions</a:t>
+            </a:r>
+            <a:r>
+              <a:rPr lang="en-US" sz="1800" dirty="0"/>
+              <a:t>, the Stream API, and the new date and time API.</a:t>
+            </a:r>
+          </a:p>
+          <a:p>
+            <a:pPr marL="457200" lvl="1" indent="0">
+              <a:buNone/>
+            </a:pPr>
+            <a:r>
+              <a:rPr lang="en-US" sz="1800" dirty="0"/>
+              <a:t>Subsequent versions (Java 9 through Java 20) have continued to add new features, enhance performance, and improve the language's capabilities.</a:t>
+            </a:r>
+          </a:p>
+          <a:p>
+            <a:pPr marL="457200" lvl="1" indent="0">
+              <a:buNone/>
+            </a:pPr>
+            <a:endParaRPr lang="en-US" sz="1800" b="1" dirty="0"/>
+          </a:p>
+          <a:p>
+            <a:pPr marL="457200" lvl="1" indent="0">
+              <a:buNone/>
+            </a:pPr>
+            <a:r>
+              <a:rPr lang="en-US" sz="1800" b="1" dirty="0">
+                <a:solidFill>
+                  <a:srgbClr val="C00000"/>
+                </a:solidFill>
+              </a:rPr>
+              <a:t>Java 22</a:t>
+            </a:r>
+            <a:r>
+              <a:rPr lang="en-US" sz="1800" dirty="0"/>
+              <a:t>, officially released on </a:t>
+            </a:r>
+            <a:r>
+              <a:rPr lang="en-US" sz="1800" b="1" dirty="0"/>
+              <a:t>March 19, 2024</a:t>
+            </a:r>
+          </a:p>
+          <a:p>
+            <a:pPr marL="0" indent="0">
+              <a:buNone/>
+            </a:pPr>
+            <a:endParaRPr lang="en-IN" sz="1800" dirty="0"/>
           </a:p>
         </p:txBody>
       </p:sp>
     </p:spTree>
     <p:extLst>
       <p:ext uri="{BB962C8B-B14F-4D97-AF65-F5344CB8AC3E}">
-        <p14:creationId xmlns:p14="http://schemas.microsoft.com/office/powerpoint/2010/main" val="2310642585"/>
+        <p14:creationId xmlns:p14="http://schemas.microsoft.com/office/powerpoint/2010/main" val="1463863436"/>
       </p:ext>
     </p:extLst>
   </p:cSld>
@@ -3929,8 +4518,135 @@
           </a:xfrm>
         </p:spPr>
         <p:txBody>
-          <a:bodyPr/>
-          <a:lstStyle/>
+          <a:bodyPr>
+            <a:normAutofit fontScale="92500" lnSpcReduction="10000"/>
+          </a:bodyPr>
+          <a:lstStyle/>
+          <a:p>
+            <a:pPr marL="0" indent="0">
+              <a:buNone/>
+            </a:pPr>
+            <a:r>
+              <a:rPr lang="en-IN" b="1" dirty="0">
+                <a:solidFill>
+                  <a:srgbClr val="C00000"/>
+                </a:solidFill>
+              </a:rPr>
+              <a:t>Flavours of Java:</a:t>
+            </a:r>
+          </a:p>
+          <a:p>
+            <a:pPr marL="0" indent="0">
+              <a:buNone/>
+            </a:pPr>
+            <a:r>
+              <a:rPr lang="en-IN" b="1" dirty="0"/>
+              <a:t>1. Java Standard Edition (Java SE)</a:t>
+            </a:r>
+          </a:p>
+          <a:p>
+            <a:pPr marL="0" indent="0">
+              <a:buNone/>
+            </a:pPr>
+            <a:r>
+              <a:rPr lang="en-IN" b="1" dirty="0"/>
+              <a:t>Purpose</a:t>
+            </a:r>
+            <a:r>
+              <a:rPr lang="en-IN" dirty="0"/>
+              <a:t>: Java SE provides the core functionality for </a:t>
+            </a:r>
+            <a:r>
+              <a:rPr lang="en-IN" b="1" dirty="0">
+                <a:solidFill>
+                  <a:schemeClr val="accent6">
+                    <a:lumMod val="50000"/>
+                  </a:schemeClr>
+                </a:solidFill>
+              </a:rPr>
+              <a:t>general-purpose programming.</a:t>
+            </a:r>
+            <a:r>
+              <a:rPr lang="en-IN" dirty="0"/>
+              <a:t> It includes the Java Development Kit (JDK), which contains the Java Runtime Environment (JRE), a compiler (</a:t>
+            </a:r>
+            <a:r>
+              <a:rPr lang="en-IN" dirty="0" err="1"/>
+              <a:t>javac</a:t>
+            </a:r>
+            <a:r>
+              <a:rPr lang="en-IN" dirty="0"/>
+              <a:t>), and various development tools.</a:t>
+            </a:r>
+          </a:p>
+          <a:p>
+            <a:pPr marL="0" indent="0">
+              <a:buNone/>
+            </a:pPr>
+            <a:endParaRPr lang="en-IN" dirty="0"/>
+          </a:p>
+          <a:p>
+            <a:pPr marL="0" indent="0">
+              <a:buNone/>
+            </a:pPr>
+            <a:r>
+              <a:rPr lang="en-IN" b="1" dirty="0"/>
+              <a:t>2. Java Enterprise Edition (Java EE), now Jakarta EE (Web Applications)</a:t>
+            </a:r>
+          </a:p>
+          <a:p>
+            <a:pPr marL="0" indent="0">
+              <a:buNone/>
+            </a:pPr>
+            <a:r>
+              <a:rPr lang="en-IN" b="1" dirty="0"/>
+              <a:t>Purpose</a:t>
+            </a:r>
+            <a:r>
+              <a:rPr lang="en-IN" dirty="0"/>
+              <a:t>: Java EE is designed for building large-scale, distributed, and component-based applications in the enterprise environment.</a:t>
+            </a:r>
+          </a:p>
+          <a:p>
+            <a:pPr marL="0" indent="0">
+              <a:buNone/>
+            </a:pPr>
+            <a:endParaRPr lang="en-IN" dirty="0"/>
+          </a:p>
+          <a:p>
+            <a:pPr marL="0" indent="0">
+              <a:buNone/>
+            </a:pPr>
+            <a:r>
+              <a:rPr lang="en-IN" b="1" dirty="0"/>
+              <a:t>3. Java Micro Edition (Java ME) (Android)</a:t>
+            </a:r>
+          </a:p>
+          <a:p>
+            <a:pPr marL="0" indent="0">
+              <a:buNone/>
+            </a:pPr>
+            <a:r>
+              <a:rPr lang="en-IN" b="1" dirty="0"/>
+              <a:t>Purpose</a:t>
+            </a:r>
+            <a:r>
+              <a:rPr lang="en-IN" dirty="0"/>
+              <a:t>: Java ME is tailored for resource-constrained devices like embedded systems, mobile phones, and Internet of Things (IoT) devices.</a:t>
+            </a:r>
+          </a:p>
+          <a:p>
+            <a:pPr marL="0" indent="0">
+              <a:buNone/>
+            </a:pPr>
+            <a:endParaRPr lang="en-IN" dirty="0"/>
+          </a:p>
+          <a:p>
+            <a:pPr marL="0" indent="0">
+              <a:buNone/>
+            </a:pPr>
+            <a:endParaRPr lang="en-IN" dirty="0"/>
+          </a:p>
           <a:p>
             <a:pPr marL="0" indent="0">
               <a:buNone/>
@@ -3942,7 +4658,7 @@
     </p:spTree>
     <p:extLst>
       <p:ext uri="{BB962C8B-B14F-4D97-AF65-F5344CB8AC3E}">
-        <p14:creationId xmlns:p14="http://schemas.microsoft.com/office/powerpoint/2010/main" val="1463863436"/>
+        <p14:creationId xmlns:p14="http://schemas.microsoft.com/office/powerpoint/2010/main" val="2459504580"/>
       </p:ext>
     </p:extLst>
   </p:cSld>
@@ -4965,7 +5681,7 @@
             </a:pPr>
             <a:r>
               <a:rPr lang="en-US" dirty="0"/>
-              <a:t>Write a Java program to list the factorial of the numbers Is 10. To calculate the factorial value use while loop. (Hint Fact of 4=4*3*2*1).</a:t>
+              <a:t>Write a Java program to list the factorial of the numbers 1 to 10. To calculate the factorial value use while loop. (Hint Fact of 4=4*3*2*1).</a:t>
             </a:r>
           </a:p>
           <a:p>
@@ -5460,25 +6176,107 @@
         </p:nvSpPr>
         <p:spPr>
           <a:xfrm>
-            <a:off x="786581" y="609600"/>
-            <a:ext cx="10567219" cy="5567363"/>
+            <a:off x="898115" y="1295400"/>
+            <a:ext cx="10567219" cy="3371850"/>
           </a:xfrm>
         </p:spPr>
         <p:txBody>
-          <a:bodyPr/>
-          <a:lstStyle/>
+          <a:bodyPr>
+            <a:normAutofit/>
+          </a:bodyPr>
+          <a:lstStyle/>
+          <a:p>
+            <a:pPr marL="0" indent="0">
+              <a:buNone/>
+            </a:pPr>
+            <a:r>
+              <a:rPr lang="en-IN" b="1" dirty="0">
+                <a:solidFill>
+                  <a:srgbClr val="00B050"/>
+                </a:solidFill>
+              </a:rPr>
+              <a:t>What is Java:</a:t>
+            </a:r>
+          </a:p>
+          <a:p>
+            <a:pPr marL="0" indent="0">
+              <a:buNone/>
+            </a:pPr>
+            <a:r>
+              <a:rPr lang="en-IN" dirty="0"/>
+              <a:t>Java is a High Level, General Purpose, Object Oriented, Platform Independent, Compiled and Interpreted, Statically Typed, Highly Secured programming language.</a:t>
+            </a:r>
+          </a:p>
           <a:p>
             <a:pPr marL="0" indent="0">
               <a:buNone/>
             </a:pPr>
             <a:endParaRPr lang="en-IN" dirty="0"/>
+          </a:p>
+          <a:p>
+            <a:pPr marL="0" indent="0">
+              <a:buNone/>
+            </a:pPr>
+            <a:r>
+              <a:rPr lang="en-IN" b="1" dirty="0"/>
+              <a:t>Java is Developed By</a:t>
+            </a:r>
+            <a:r>
+              <a:rPr lang="en-IN" dirty="0"/>
+              <a:t>: </a:t>
+            </a:r>
+            <a:r>
+              <a:rPr lang="en-US" b="1" dirty="0">
+                <a:solidFill>
+                  <a:schemeClr val="accent5">
+                    <a:lumMod val="50000"/>
+                  </a:schemeClr>
+                </a:solidFill>
+              </a:rPr>
+              <a:t>James Gosling</a:t>
+            </a:r>
+            <a:r>
+              <a:rPr lang="en-US" dirty="0"/>
+              <a:t>, </a:t>
+            </a:r>
+            <a:r>
+              <a:rPr lang="en-US" b="1" dirty="0">
+                <a:solidFill>
+                  <a:schemeClr val="accent5">
+                    <a:lumMod val="50000"/>
+                  </a:schemeClr>
+                </a:solidFill>
+              </a:rPr>
+              <a:t>Patrick Naughton</a:t>
+            </a:r>
+            <a:r>
+              <a:rPr lang="en-US" dirty="0"/>
+              <a:t>, and </a:t>
+            </a:r>
+            <a:r>
+              <a:rPr lang="en-US" b="1" dirty="0">
+                <a:solidFill>
+                  <a:schemeClr val="accent5">
+                    <a:lumMod val="50000"/>
+                  </a:schemeClr>
+                </a:solidFill>
+              </a:rPr>
+              <a:t>Mike Sheridan</a:t>
+            </a:r>
+            <a:endParaRPr lang="en-IN" b="1" dirty="0">
+              <a:solidFill>
+                <a:schemeClr val="accent5">
+                  <a:lumMod val="50000"/>
+                </a:schemeClr>
+              </a:solidFill>
+            </a:endParaRPr>
           </a:p>
         </p:txBody>
       </p:sp>
     </p:spTree>
     <p:extLst>
       <p:ext uri="{BB962C8B-B14F-4D97-AF65-F5344CB8AC3E}">
-        <p14:creationId xmlns:p14="http://schemas.microsoft.com/office/powerpoint/2010/main" val="730276957"/>
+        <p14:creationId xmlns:p14="http://schemas.microsoft.com/office/powerpoint/2010/main" val="3779466235"/>
       </p:ext>
     </p:extLst>
   </p:cSld>

</xml_diff>